<commit_message>
Introduce initial UI sketch slide This includes: - The slide containing the paper prototype UI, before the figma version - The slide's image file, kept within the User Interface Images folder
</commit_message>
<xml_diff>
--- a/UI Mockup.pptx
+++ b/UI Mockup.pptx
@@ -5,8 +5,9 @@
     <p:sldMasterId id="2147483648" r:id="rId1"/>
   </p:sldMasterIdLst>
   <p:sldIdLst>
-    <p:sldId id="257" r:id="rId2"/>
-    <p:sldId id="258" r:id="rId3"/>
+    <p:sldId id="259" r:id="rId2"/>
+    <p:sldId id="257" r:id="rId3"/>
+    <p:sldId id="258" r:id="rId4"/>
   </p:sldIdLst>
   <p:sldSz cx="12192000" cy="6858000"/>
   <p:notesSz cx="6858000" cy="9144000"/>
@@ -105,7 +106,65 @@
       </a:defRPr>
     </a:lvl9pPr>
   </p:defaultTextStyle>
+  <p:extLst>
+    <p:ext uri="{EFAFB233-063F-42B5-8137-9DF3F51BA10A}">
+      <p15:sldGuideLst xmlns:p15="http://schemas.microsoft.com/office/powerpoint/2012/main"/>
+    </p:ext>
+  </p:extLst>
 </p:presentation>
+</file>
+
+<file path=ppt/revisionInfo.xml><?xml version="1.0" encoding="utf-8"?>
+<p1510:revInfo xmlns:a="http://schemas.openxmlformats.org/drawingml/2006/main" xmlns:r="http://schemas.openxmlformats.org/officeDocument/2006/relationships" xmlns:p1510="http://schemas.microsoft.com/office/powerpoint/2015/10/main">
+  <p1510:revLst>
+    <p1510:client id="{FC3603E7-A0BA-4FA5-9CA7-7DB1F73A407E}" v="1" dt="2023-10-24T05:59:03.064"/>
+  </p1510:revLst>
+</p1510:revInfo>
+</file>
+
+<file path=ppt/changesInfos/changesInfo1.xml><?xml version="1.0" encoding="utf-8"?>
+<pc:chgInfo xmlns:a="http://schemas.openxmlformats.org/drawingml/2006/main" xmlns:r="http://schemas.openxmlformats.org/officeDocument/2006/relationships" xmlns:ac="http://schemas.microsoft.com/office/drawing/2013/main/command" xmlns:pc="http://schemas.microsoft.com/office/powerpoint/2013/main/command">
+  <pc:docChgLst>
+    <pc:chgData name="Cian Ashby" userId="428f7d02-2409-42df-941b-8a5f2485308b" providerId="ADAL" clId="{FC3603E7-A0BA-4FA5-9CA7-7DB1F73A407E}"/>
+    <pc:docChg chg="addSld modSld sldOrd">
+      <pc:chgData name="Cian Ashby" userId="428f7d02-2409-42df-941b-8a5f2485308b" providerId="ADAL" clId="{FC3603E7-A0BA-4FA5-9CA7-7DB1F73A407E}" dt="2023-10-24T06:00:12.095" v="26"/>
+      <pc:docMkLst>
+        <pc:docMk/>
+      </pc:docMkLst>
+      <pc:sldChg chg="addSp delSp modSp new mod ord">
+        <pc:chgData name="Cian Ashby" userId="428f7d02-2409-42df-941b-8a5f2485308b" providerId="ADAL" clId="{FC3603E7-A0BA-4FA5-9CA7-7DB1F73A407E}" dt="2023-10-24T06:00:12.095" v="26"/>
+        <pc:sldMkLst>
+          <pc:docMk/>
+          <pc:sldMk cId="2508038474" sldId="259"/>
+        </pc:sldMkLst>
+        <pc:spChg chg="mod">
+          <ac:chgData name="Cian Ashby" userId="428f7d02-2409-42df-941b-8a5f2485308b" providerId="ADAL" clId="{FC3603E7-A0BA-4FA5-9CA7-7DB1F73A407E}" dt="2023-10-24T05:58:45.485" v="17" actId="20577"/>
+          <ac:spMkLst>
+            <pc:docMk/>
+            <pc:sldMk cId="2508038474" sldId="259"/>
+            <ac:spMk id="2" creationId="{81F8D0E1-41E5-5D57-F90D-626CDB30EC72}"/>
+          </ac:spMkLst>
+        </pc:spChg>
+        <pc:spChg chg="del">
+          <ac:chgData name="Cian Ashby" userId="428f7d02-2409-42df-941b-8a5f2485308b" providerId="ADAL" clId="{FC3603E7-A0BA-4FA5-9CA7-7DB1F73A407E}" dt="2023-10-24T05:59:03.063" v="18" actId="931"/>
+          <ac:spMkLst>
+            <pc:docMk/>
+            <pc:sldMk cId="2508038474" sldId="259"/>
+            <ac:spMk id="3" creationId="{0228B18A-A9BA-1FE8-6BB5-1E74F07401A7}"/>
+          </ac:spMkLst>
+        </pc:spChg>
+        <pc:picChg chg="add mod">
+          <ac:chgData name="Cian Ashby" userId="428f7d02-2409-42df-941b-8a5f2485308b" providerId="ADAL" clId="{FC3603E7-A0BA-4FA5-9CA7-7DB1F73A407E}" dt="2023-10-24T05:59:26.749" v="24" actId="1076"/>
+          <ac:picMkLst>
+            <pc:docMk/>
+            <pc:sldMk cId="2508038474" sldId="259"/>
+            <ac:picMk id="5" creationId="{FC62F7D8-1506-EAB7-3B37-EB09E7473B58}"/>
+          </ac:picMkLst>
+        </pc:picChg>
+      </pc:sldChg>
+    </pc:docChg>
+  </pc:docChgLst>
+</pc:chgInfo>
 </file>
 
 <file path=ppt/slideLayouts/slideLayout1.xml><?xml version="1.0" encoding="utf-8"?>
@@ -257,7 +316,7 @@
           <a:p>
             <a:fld id="{BD3AB757-9B27-485B-97CC-BD2C3B1D7B7E}" type="datetimeFigureOut">
               <a:rPr lang="en-GB" smtClean="0"/>
-              <a:t>18/10/2023</a:t>
+              <a:t>24/10/2023</a:t>
             </a:fld>
             <a:endParaRPr lang="en-GB"/>
           </a:p>
@@ -457,7 +516,7 @@
           <a:p>
             <a:fld id="{BD3AB757-9B27-485B-97CC-BD2C3B1D7B7E}" type="datetimeFigureOut">
               <a:rPr lang="en-GB" smtClean="0"/>
-              <a:t>18/10/2023</a:t>
+              <a:t>24/10/2023</a:t>
             </a:fld>
             <a:endParaRPr lang="en-GB"/>
           </a:p>
@@ -667,7 +726,7 @@
           <a:p>
             <a:fld id="{BD3AB757-9B27-485B-97CC-BD2C3B1D7B7E}" type="datetimeFigureOut">
               <a:rPr lang="en-GB" smtClean="0"/>
-              <a:t>18/10/2023</a:t>
+              <a:t>24/10/2023</a:t>
             </a:fld>
             <a:endParaRPr lang="en-GB"/>
           </a:p>
@@ -867,7 +926,7 @@
           <a:p>
             <a:fld id="{BD3AB757-9B27-485B-97CC-BD2C3B1D7B7E}" type="datetimeFigureOut">
               <a:rPr lang="en-GB" smtClean="0"/>
-              <a:t>18/10/2023</a:t>
+              <a:t>24/10/2023</a:t>
             </a:fld>
             <a:endParaRPr lang="en-GB"/>
           </a:p>
@@ -1143,7 +1202,7 @@
           <a:p>
             <a:fld id="{BD3AB757-9B27-485B-97CC-BD2C3B1D7B7E}" type="datetimeFigureOut">
               <a:rPr lang="en-GB" smtClean="0"/>
-              <a:t>18/10/2023</a:t>
+              <a:t>24/10/2023</a:t>
             </a:fld>
             <a:endParaRPr lang="en-GB"/>
           </a:p>
@@ -1411,7 +1470,7 @@
           <a:p>
             <a:fld id="{BD3AB757-9B27-485B-97CC-BD2C3B1D7B7E}" type="datetimeFigureOut">
               <a:rPr lang="en-GB" smtClean="0"/>
-              <a:t>18/10/2023</a:t>
+              <a:t>24/10/2023</a:t>
             </a:fld>
             <a:endParaRPr lang="en-GB"/>
           </a:p>
@@ -1826,7 +1885,7 @@
           <a:p>
             <a:fld id="{BD3AB757-9B27-485B-97CC-BD2C3B1D7B7E}" type="datetimeFigureOut">
               <a:rPr lang="en-GB" smtClean="0"/>
-              <a:t>18/10/2023</a:t>
+              <a:t>24/10/2023</a:t>
             </a:fld>
             <a:endParaRPr lang="en-GB"/>
           </a:p>
@@ -1968,7 +2027,7 @@
           <a:p>
             <a:fld id="{BD3AB757-9B27-485B-97CC-BD2C3B1D7B7E}" type="datetimeFigureOut">
               <a:rPr lang="en-GB" smtClean="0"/>
-              <a:t>18/10/2023</a:t>
+              <a:t>24/10/2023</a:t>
             </a:fld>
             <a:endParaRPr lang="en-GB"/>
           </a:p>
@@ -2081,7 +2140,7 @@
           <a:p>
             <a:fld id="{BD3AB757-9B27-485B-97CC-BD2C3B1D7B7E}" type="datetimeFigureOut">
               <a:rPr lang="en-GB" smtClean="0"/>
-              <a:t>18/10/2023</a:t>
+              <a:t>24/10/2023</a:t>
             </a:fld>
             <a:endParaRPr lang="en-GB"/>
           </a:p>
@@ -2394,7 +2453,7 @@
           <a:p>
             <a:fld id="{BD3AB757-9B27-485B-97CC-BD2C3B1D7B7E}" type="datetimeFigureOut">
               <a:rPr lang="en-GB" smtClean="0"/>
-              <a:t>18/10/2023</a:t>
+              <a:t>24/10/2023</a:t>
             </a:fld>
             <a:endParaRPr lang="en-GB"/>
           </a:p>
@@ -2683,7 +2742,7 @@
           <a:p>
             <a:fld id="{BD3AB757-9B27-485B-97CC-BD2C3B1D7B7E}" type="datetimeFigureOut">
               <a:rPr lang="en-GB" smtClean="0"/>
-              <a:t>18/10/2023</a:t>
+              <a:t>24/10/2023</a:t>
             </a:fld>
             <a:endParaRPr lang="en-GB"/>
           </a:p>
@@ -2926,7 +2985,7 @@
           <a:p>
             <a:fld id="{BD3AB757-9B27-485B-97CC-BD2C3B1D7B7E}" type="datetimeFigureOut">
               <a:rPr lang="en-GB" smtClean="0"/>
-              <a:t>18/10/2023</a:t>
+              <a:t>24/10/2023</a:t>
             </a:fld>
             <a:endParaRPr lang="en-GB"/>
           </a:p>
@@ -3348,6 +3407,100 @@
           <p:cNvPr id="2" name="Title 1">
             <a:extLst>
               <a:ext uri="{FF2B5EF4-FFF2-40B4-BE49-F238E27FC236}">
+                <a16:creationId xmlns:a16="http://schemas.microsoft.com/office/drawing/2014/main" id="{81F8D0E1-41E5-5D57-F90D-626CDB30EC72}"/>
+              </a:ext>
+            </a:extLst>
+          </p:cNvPr>
+          <p:cNvSpPr>
+            <a:spLocks noGrp="1"/>
+          </p:cNvSpPr>
+          <p:nvPr>
+            <p:ph type="title"/>
+          </p:nvPr>
+        </p:nvSpPr>
+        <p:spPr/>
+        <p:txBody>
+          <a:bodyPr/>
+          <a:lstStyle/>
+          <a:p>
+            <a:r>
+              <a:rPr lang="en-US" dirty="0"/>
+              <a:t>Initial UI Sketch</a:t>
+            </a:r>
+            <a:endParaRPr lang="en-GB" dirty="0"/>
+          </a:p>
+        </p:txBody>
+      </p:sp>
+      <p:pic>
+        <p:nvPicPr>
+          <p:cNvPr id="5" name="Content Placeholder 4" descr="A drawing of a clock and a few notes&#10;&#10;Description automatically generated with medium confidence">
+            <a:extLst>
+              <a:ext uri="{FF2B5EF4-FFF2-40B4-BE49-F238E27FC236}">
+                <a16:creationId xmlns:a16="http://schemas.microsoft.com/office/drawing/2014/main" id="{FC62F7D8-1506-EAB7-3B37-EB09E7473B58}"/>
+              </a:ext>
+            </a:extLst>
+          </p:cNvPr>
+          <p:cNvPicPr>
+            <a:picLocks noGrp="1" noChangeAspect="1"/>
+          </p:cNvPicPr>
+          <p:nvPr>
+            <p:ph idx="1"/>
+          </p:nvPr>
+        </p:nvPicPr>
+        <p:blipFill>
+          <a:blip r:embed="rId2">
+            <a:extLst>
+              <a:ext uri="{28A0092B-C50C-407E-A947-70E740481C1C}">
+                <a14:useLocalDpi xmlns:a14="http://schemas.microsoft.com/office/drawing/2010/main" val="0"/>
+              </a:ext>
+            </a:extLst>
+          </a:blip>
+          <a:stretch>
+            <a:fillRect/>
+          </a:stretch>
+        </p:blipFill>
+        <p:spPr>
+          <a:xfrm>
+            <a:off x="1036627" y="1373233"/>
+            <a:ext cx="10118745" cy="5119642"/>
+          </a:xfrm>
+        </p:spPr>
+      </p:pic>
+    </p:spTree>
+    <p:extLst>
+      <p:ext uri="{BB962C8B-B14F-4D97-AF65-F5344CB8AC3E}">
+        <p14:creationId xmlns:p14="http://schemas.microsoft.com/office/powerpoint/2010/main" val="2508038474"/>
+      </p:ext>
+    </p:extLst>
+  </p:cSld>
+  <p:clrMapOvr>
+    <a:masterClrMapping/>
+  </p:clrMapOvr>
+</p:sld>
+</file>
+
+<file path=ppt/slides/slide2.xml><?xml version="1.0" encoding="utf-8"?>
+<p:sld xmlns:a="http://schemas.openxmlformats.org/drawingml/2006/main" xmlns:r="http://schemas.openxmlformats.org/officeDocument/2006/relationships" xmlns:p="http://schemas.openxmlformats.org/presentationml/2006/main">
+  <p:cSld>
+    <p:spTree>
+      <p:nvGrpSpPr>
+        <p:cNvPr id="1" name=""/>
+        <p:cNvGrpSpPr/>
+        <p:nvPr/>
+      </p:nvGrpSpPr>
+      <p:grpSpPr>
+        <a:xfrm>
+          <a:off x="0" y="0"/>
+          <a:ext cx="0" cy="0"/>
+          <a:chOff x="0" y="0"/>
+          <a:chExt cx="0" cy="0"/>
+        </a:xfrm>
+      </p:grpSpPr>
+      <p:sp>
+        <p:nvSpPr>
+          <p:cNvPr id="2" name="Title 1">
+            <a:extLst>
+              <a:ext uri="{FF2B5EF4-FFF2-40B4-BE49-F238E27FC236}">
                 <a16:creationId xmlns:a16="http://schemas.microsoft.com/office/drawing/2014/main" id="{0BFFF94C-392D-D0D9-2621-B6C1CF0188B7}"/>
               </a:ext>
             </a:extLst>
@@ -3576,7 +3729,7 @@
 </p:sld>
 </file>
 
-<file path=ppt/slides/slide2.xml><?xml version="1.0" encoding="utf-8"?>
+<file path=ppt/slides/slide3.xml><?xml version="1.0" encoding="utf-8"?>
 <p:sld xmlns:a="http://schemas.openxmlformats.org/drawingml/2006/main" xmlns:r="http://schemas.openxmlformats.org/officeDocument/2006/relationships" xmlns:p="http://schemas.openxmlformats.org/presentationml/2006/main">
   <p:cSld>
     <p:spTree>

</xml_diff>